<commit_message>
die ene dia fix
</commit_message>
<xml_diff>
--- a/Eindpresentatie_LMP.pptx
+++ b/Eindpresentatie_LMP.pptx
@@ -5,10 +5,10 @@
     <p:sldMasterId id="2147483648" r:id="rId6"/>
   </p:sldMasterIdLst>
   <p:notesMasterIdLst>
-    <p:notesMasterId r:id="rId30"/>
+    <p:notesMasterId r:id="rId31"/>
   </p:notesMasterIdLst>
   <p:handoutMasterIdLst>
-    <p:handoutMasterId r:id="rId31"/>
+    <p:handoutMasterId r:id="rId32"/>
   </p:handoutMasterIdLst>
   <p:sldIdLst>
     <p:sldId id="256" r:id="rId7"/>
@@ -25,15 +25,16 @@
     <p:sldId id="277" r:id="rId18"/>
     <p:sldId id="285" r:id="rId19"/>
     <p:sldId id="286" r:id="rId20"/>
-    <p:sldId id="287" r:id="rId21"/>
-    <p:sldId id="291" r:id="rId22"/>
-    <p:sldId id="292" r:id="rId23"/>
-    <p:sldId id="279" r:id="rId24"/>
-    <p:sldId id="282" r:id="rId25"/>
-    <p:sldId id="290" r:id="rId26"/>
-    <p:sldId id="283" r:id="rId27"/>
-    <p:sldId id="284" r:id="rId28"/>
-    <p:sldId id="269" r:id="rId29"/>
+    <p:sldId id="293" r:id="rId21"/>
+    <p:sldId id="287" r:id="rId22"/>
+    <p:sldId id="291" r:id="rId23"/>
+    <p:sldId id="292" r:id="rId24"/>
+    <p:sldId id="279" r:id="rId25"/>
+    <p:sldId id="282" r:id="rId26"/>
+    <p:sldId id="290" r:id="rId27"/>
+    <p:sldId id="283" r:id="rId28"/>
+    <p:sldId id="284" r:id="rId29"/>
+    <p:sldId id="269" r:id="rId30"/>
   </p:sldIdLst>
   <p:sldSz cx="12192000" cy="6858000"/>
   <p:notesSz cx="7010400" cy="9296400"/>
@@ -331,7 +332,7 @@
             <a:fld id="{0D17EFB8-940B-4475-A4F4-BBE959E16336}" type="slidenum">
               <a:rPr lang="nl-BE" smtClean="0"/>
               <a:pPr/>
-              <a:t>‹#›</a:t>
+              <a:t>‹nr.›</a:t>
             </a:fld>
             <a:endParaRPr lang="nl-BE"/>
           </a:p>
@@ -562,7 +563,7 @@
             <a:fld id="{89ED9555-764A-4B78-873A-3D7406AAEA2B}" type="slidenum">
               <a:rPr lang="nl-BE" smtClean="0"/>
               <a:pPr/>
-              <a:t>‹#›</a:t>
+              <a:t>‹nr.›</a:t>
             </a:fld>
             <a:endParaRPr lang="nl-BE"/>
           </a:p>
@@ -1015,7 +1016,7 @@
             <a:fld id="{89ED9555-764A-4B78-873A-3D7406AAEA2B}" type="slidenum">
               <a:rPr lang="nl-BE" smtClean="0"/>
               <a:pPr/>
-              <a:t>23</a:t>
+              <a:t>24</a:t>
             </a:fld>
             <a:endParaRPr lang="nl-BE"/>
           </a:p>
@@ -1378,7 +1379,7 @@
             <a:fld id="{3B80295F-48CD-49FC-897A-CCEC919B8070}" type="slidenum">
               <a:rPr lang="nl-BE" smtClean="0"/>
               <a:pPr/>
-              <a:t>‹#›</a:t>
+              <a:t>‹nr.›</a:t>
             </a:fld>
             <a:endParaRPr lang="nl-BE" dirty="0"/>
           </a:p>
@@ -1722,7 +1723,7 @@
             <a:fld id="{3B80295F-48CD-49FC-897A-CCEC919B8070}" type="slidenum">
               <a:rPr lang="nl-BE" smtClean="0"/>
               <a:pPr/>
-              <a:t>‹#›</a:t>
+              <a:t>‹nr.›</a:t>
             </a:fld>
             <a:endParaRPr lang="nl-BE" dirty="0"/>
           </a:p>
@@ -1937,7 +1938,7 @@
             <a:fld id="{3B80295F-48CD-49FC-897A-CCEC919B8070}" type="slidenum">
               <a:rPr lang="nl-BE" smtClean="0"/>
               <a:pPr/>
-              <a:t>‹#›</a:t>
+              <a:t>‹nr.›</a:t>
             </a:fld>
             <a:endParaRPr lang="nl-BE" dirty="0"/>
           </a:p>
@@ -2375,7 +2376,7 @@
             <a:fld id="{3B80295F-48CD-49FC-897A-CCEC919B8070}" type="slidenum">
               <a:rPr lang="nl-BE" smtClean="0"/>
               <a:pPr/>
-              <a:t>‹#›</a:t>
+              <a:t>‹nr.›</a:t>
             </a:fld>
             <a:endParaRPr lang="nl-BE" dirty="0"/>
           </a:p>
@@ -2617,7 +2618,7 @@
             <a:fld id="{3B80295F-48CD-49FC-897A-CCEC919B8070}" type="slidenum">
               <a:rPr lang="nl-BE" smtClean="0"/>
               <a:pPr/>
-              <a:t>‹#›</a:t>
+              <a:t>‹nr.›</a:t>
             </a:fld>
             <a:endParaRPr lang="nl-BE" dirty="0"/>
           </a:p>
@@ -2704,7 +2705,7 @@
             <a:fld id="{3B80295F-48CD-49FC-897A-CCEC919B8070}" type="slidenum">
               <a:rPr lang="nl-BE" smtClean="0"/>
               <a:pPr/>
-              <a:t>‹#›</a:t>
+              <a:t>‹nr.›</a:t>
             </a:fld>
             <a:endParaRPr lang="nl-BE" dirty="0"/>
           </a:p>
@@ -2890,7 +2891,7 @@
             <a:fld id="{3B80295F-48CD-49FC-897A-CCEC919B8070}" type="slidenum">
               <a:rPr lang="nl-BE" smtClean="0"/>
               <a:pPr/>
-              <a:t>‹#›</a:t>
+              <a:t>‹nr.›</a:t>
             </a:fld>
             <a:endParaRPr lang="nl-BE" dirty="0"/>
           </a:p>
@@ -3154,7 +3155,7 @@
             <a:fld id="{3B80295F-48CD-49FC-897A-CCEC919B8070}" type="slidenum">
               <a:rPr lang="nl-BE" smtClean="0"/>
               <a:pPr/>
-              <a:t>‹#›</a:t>
+              <a:t>‹nr.›</a:t>
             </a:fld>
             <a:endParaRPr lang="nl-BE" dirty="0"/>
           </a:p>
@@ -4674,6 +4675,496 @@
           <a:chExt cx="0" cy="0"/>
         </a:xfrm>
       </p:grpSpPr>
+      <p:sp>
+        <p:nvSpPr>
+          <p:cNvPr id="2" name="Tijdelijke aanduiding voor inhoud 1"/>
+          <p:cNvSpPr>
+            <a:spLocks noGrp="1"/>
+          </p:cNvSpPr>
+          <p:nvPr>
+            <p:ph idx="1"/>
+          </p:nvPr>
+        </p:nvSpPr>
+        <p:spPr/>
+        <p:txBody>
+          <a:bodyPr/>
+          <a:lstStyle/>
+          <a:p>
+            <a:r>
+              <a:rPr lang="en-GB" dirty="0" err="1"/>
+              <a:t>Encryptie</a:t>
+            </a:r>
+            <a:r>
+              <a:rPr lang="en-GB" dirty="0"/>
+              <a:t> van </a:t>
+            </a:r>
+            <a:r>
+              <a:rPr lang="en-GB" dirty="0" err="1"/>
+              <a:t>dataoverdracht</a:t>
+            </a:r>
+            <a:endParaRPr lang="en-GB" dirty="0"/>
+          </a:p>
+          <a:p>
+            <a:r>
+              <a:rPr lang="en-GB" dirty="0"/>
+              <a:t>Privacy</a:t>
+            </a:r>
+          </a:p>
+          <a:p>
+            <a:r>
+              <a:rPr lang="en-GB" dirty="0" err="1"/>
+              <a:t>Beveiliging</a:t>
+            </a:r>
+            <a:r>
+              <a:rPr lang="en-GB" dirty="0"/>
+              <a:t> </a:t>
+            </a:r>
+            <a:r>
+              <a:rPr lang="en-GB" dirty="0" err="1"/>
+              <a:t>gevoelige</a:t>
+            </a:r>
+            <a:r>
+              <a:rPr lang="en-GB" dirty="0"/>
+              <a:t> </a:t>
+            </a:r>
+            <a:r>
+              <a:rPr lang="en-GB" dirty="0" err="1"/>
+              <a:t>gegevens</a:t>
+            </a:r>
+            <a:endParaRPr lang="en-GB" dirty="0"/>
+          </a:p>
+        </p:txBody>
+      </p:sp>
+      <p:sp>
+        <p:nvSpPr>
+          <p:cNvPr id="3" name="Titel 2"/>
+          <p:cNvSpPr>
+            <a:spLocks noGrp="1"/>
+          </p:cNvSpPr>
+          <p:nvPr>
+            <p:ph type="title"/>
+          </p:nvPr>
+        </p:nvSpPr>
+        <p:spPr/>
+        <p:txBody>
+          <a:bodyPr/>
+          <a:lstStyle/>
+          <a:p>
+            <a:r>
+              <a:rPr lang="en-GB" dirty="0"/>
+              <a:t>HTTPS</a:t>
+            </a:r>
+          </a:p>
+        </p:txBody>
+      </p:sp>
+      <p:sp>
+        <p:nvSpPr>
+          <p:cNvPr id="4" name="Tijdelijke aanduiding voor dianummer 3"/>
+          <p:cNvSpPr>
+            <a:spLocks noGrp="1"/>
+          </p:cNvSpPr>
+          <p:nvPr>
+            <p:ph type="sldNum" sz="quarter" idx="11"/>
+          </p:nvPr>
+        </p:nvSpPr>
+        <p:spPr/>
+        <p:txBody>
+          <a:bodyPr/>
+          <a:lstStyle/>
+          <a:p>
+            <a:fld id="{3B80295F-48CD-49FC-897A-CCEC919B8070}" type="slidenum">
+              <a:rPr lang="nl-BE" smtClean="0"/>
+              <a:pPr/>
+              <a:t>15</a:t>
+            </a:fld>
+            <a:endParaRPr lang="nl-BE" dirty="0"/>
+          </a:p>
+        </p:txBody>
+      </p:sp>
+      <p:sp>
+        <p:nvSpPr>
+          <p:cNvPr id="5" name="Tijdelijke aanduiding voor voettekst 4"/>
+          <p:cNvSpPr>
+            <a:spLocks noGrp="1"/>
+          </p:cNvSpPr>
+          <p:nvPr>
+            <p:ph type="ftr" sz="quarter" idx="12"/>
+          </p:nvPr>
+        </p:nvSpPr>
+        <p:spPr/>
+        <p:txBody>
+          <a:bodyPr/>
+          <a:lstStyle/>
+          <a:p>
+            <a:endParaRPr lang="nl-BE" dirty="0"/>
+          </a:p>
+        </p:txBody>
+      </p:sp>
+      <p:pic>
+        <p:nvPicPr>
+          <p:cNvPr id="6" name="Tijdelijke aanduiding voor inhoud 6"/>
+          <p:cNvPicPr>
+            <a:picLocks noChangeAspect="1"/>
+          </p:cNvPicPr>
+          <p:nvPr/>
+        </p:nvPicPr>
+        <p:blipFill rotWithShape="1">
+          <a:blip r:embed="rId2">
+            <a:extLst>
+              <a:ext uri="{28A0092B-C50C-407E-A947-70E740481C1C}">
+                <a14:useLocalDpi xmlns:a14="http://schemas.microsoft.com/office/drawing/2010/main" val="0"/>
+              </a:ext>
+            </a:extLst>
+          </a:blip>
+          <a:srcRect r="67175" b="72036"/>
+          <a:stretch/>
+        </p:blipFill>
+        <p:spPr>
+          <a:xfrm>
+            <a:off x="3094063" y="1927765"/>
+            <a:ext cx="6003874" cy="2877058"/>
+          </a:xfrm>
+          <a:prstGeom prst="rect">
+            <a:avLst/>
+          </a:prstGeom>
+        </p:spPr>
+      </p:pic>
+      <p:pic>
+        <p:nvPicPr>
+          <p:cNvPr id="7" name="Afbeelding 6"/>
+          <p:cNvPicPr>
+            <a:picLocks noChangeAspect="1"/>
+          </p:cNvPicPr>
+          <p:nvPr/>
+        </p:nvPicPr>
+        <p:blipFill>
+          <a:blip r:embed="rId3">
+            <a:extLst>
+              <a:ext uri="{28A0092B-C50C-407E-A947-70E740481C1C}">
+                <a14:useLocalDpi xmlns:a14="http://schemas.microsoft.com/office/drawing/2010/main" val="0"/>
+              </a:ext>
+            </a:extLst>
+          </a:blip>
+          <a:stretch>
+            <a:fillRect/>
+          </a:stretch>
+        </p:blipFill>
+        <p:spPr>
+          <a:xfrm>
+            <a:off x="3791744" y="1152000"/>
+            <a:ext cx="6364304" cy="4537801"/>
+          </a:xfrm>
+          <a:prstGeom prst="rect">
+            <a:avLst/>
+          </a:prstGeom>
+        </p:spPr>
+      </p:pic>
+    </p:spTree>
+    <p:extLst>
+      <p:ext uri="{BB962C8B-B14F-4D97-AF65-F5344CB8AC3E}">
+        <p14:creationId xmlns:p14="http://schemas.microsoft.com/office/powerpoint/2010/main" val="1000869668"/>
+      </p:ext>
+    </p:extLst>
+  </p:cSld>
+  <p:clrMapOvr>
+    <a:masterClrMapping/>
+  </p:clrMapOvr>
+  <p:timing>
+    <p:tnLst>
+      <p:par>
+        <p:cTn id="1" dur="indefinite" restart="never" nodeType="tmRoot">
+          <p:childTnLst>
+            <p:seq concurrent="1" nextAc="seek">
+              <p:cTn id="2" dur="indefinite" nodeType="mainSeq">
+                <p:childTnLst>
+                  <p:par>
+                    <p:cTn id="3" fill="hold">
+                      <p:stCondLst>
+                        <p:cond delay="indefinite"/>
+                      </p:stCondLst>
+                      <p:childTnLst>
+                        <p:par>
+                          <p:cTn id="4" fill="hold">
+                            <p:stCondLst>
+                              <p:cond delay="0"/>
+                            </p:stCondLst>
+                            <p:childTnLst>
+                              <p:par>
+                                <p:cTn id="5" presetID="1" presetClass="exit" presetSubtype="0" fill="hold" nodeType="clickEffect">
+                                  <p:stCondLst>
+                                    <p:cond delay="0"/>
+                                  </p:stCondLst>
+                                  <p:childTnLst>
+                                    <p:set>
+                                      <p:cBhvr>
+                                        <p:cTn id="6" dur="1" fill="hold">
+                                          <p:stCondLst>
+                                            <p:cond delay="0"/>
+                                          </p:stCondLst>
+                                        </p:cTn>
+                                        <p:tgtEl>
+                                          <p:spTgt spid="2">
+                                            <p:txEl>
+                                              <p:pRg st="0" end="0"/>
+                                            </p:txEl>
+                                          </p:spTgt>
+                                        </p:tgtEl>
+                                        <p:attrNameLst>
+                                          <p:attrName>style.visibility</p:attrName>
+                                        </p:attrNameLst>
+                                      </p:cBhvr>
+                                      <p:to>
+                                        <p:strVal val="hidden"/>
+                                      </p:to>
+                                    </p:set>
+                                  </p:childTnLst>
+                                </p:cTn>
+                              </p:par>
+                              <p:par>
+                                <p:cTn id="7" presetID="1" presetClass="exit" presetSubtype="0" fill="hold" nodeType="withEffect">
+                                  <p:stCondLst>
+                                    <p:cond delay="0"/>
+                                  </p:stCondLst>
+                                  <p:childTnLst>
+                                    <p:set>
+                                      <p:cBhvr>
+                                        <p:cTn id="8" dur="1" fill="hold">
+                                          <p:stCondLst>
+                                            <p:cond delay="0"/>
+                                          </p:stCondLst>
+                                        </p:cTn>
+                                        <p:tgtEl>
+                                          <p:spTgt spid="2">
+                                            <p:txEl>
+                                              <p:pRg st="1" end="1"/>
+                                            </p:txEl>
+                                          </p:spTgt>
+                                        </p:tgtEl>
+                                        <p:attrNameLst>
+                                          <p:attrName>style.visibility</p:attrName>
+                                        </p:attrNameLst>
+                                      </p:cBhvr>
+                                      <p:to>
+                                        <p:strVal val="hidden"/>
+                                      </p:to>
+                                    </p:set>
+                                  </p:childTnLst>
+                                </p:cTn>
+                              </p:par>
+                              <p:par>
+                                <p:cTn id="9" presetID="1" presetClass="exit" presetSubtype="0" fill="hold" nodeType="withEffect">
+                                  <p:stCondLst>
+                                    <p:cond delay="0"/>
+                                  </p:stCondLst>
+                                  <p:childTnLst>
+                                    <p:set>
+                                      <p:cBhvr>
+                                        <p:cTn id="10" dur="1" fill="hold">
+                                          <p:stCondLst>
+                                            <p:cond delay="0"/>
+                                          </p:stCondLst>
+                                        </p:cTn>
+                                        <p:tgtEl>
+                                          <p:spTgt spid="2">
+                                            <p:txEl>
+                                              <p:pRg st="2" end="2"/>
+                                            </p:txEl>
+                                          </p:spTgt>
+                                        </p:tgtEl>
+                                        <p:attrNameLst>
+                                          <p:attrName>style.visibility</p:attrName>
+                                        </p:attrNameLst>
+                                      </p:cBhvr>
+                                      <p:to>
+                                        <p:strVal val="hidden"/>
+                                      </p:to>
+                                    </p:set>
+                                  </p:childTnLst>
+                                </p:cTn>
+                              </p:par>
+                              <p:par>
+                                <p:cTn id="11" presetID="1" presetClass="entr" presetSubtype="0" fill="hold" nodeType="withEffect">
+                                  <p:stCondLst>
+                                    <p:cond delay="0"/>
+                                  </p:stCondLst>
+                                  <p:childTnLst>
+                                    <p:set>
+                                      <p:cBhvr>
+                                        <p:cTn id="12" dur="1" fill="hold">
+                                          <p:stCondLst>
+                                            <p:cond delay="0"/>
+                                          </p:stCondLst>
+                                        </p:cTn>
+                                        <p:tgtEl>
+                                          <p:spTgt spid="6"/>
+                                        </p:tgtEl>
+                                        <p:attrNameLst>
+                                          <p:attrName>style.visibility</p:attrName>
+                                        </p:attrNameLst>
+                                      </p:cBhvr>
+                                      <p:to>
+                                        <p:strVal val="visible"/>
+                                      </p:to>
+                                    </p:set>
+                                  </p:childTnLst>
+                                </p:cTn>
+                              </p:par>
+                            </p:childTnLst>
+                          </p:cTn>
+                        </p:par>
+                      </p:childTnLst>
+                    </p:cTn>
+                  </p:par>
+                  <p:par>
+                    <p:cTn id="13" fill="hold">
+                      <p:stCondLst>
+                        <p:cond delay="indefinite"/>
+                      </p:stCondLst>
+                      <p:childTnLst>
+                        <p:par>
+                          <p:cTn id="14" fill="hold">
+                            <p:stCondLst>
+                              <p:cond delay="0"/>
+                            </p:stCondLst>
+                            <p:childTnLst>
+                              <p:par>
+                                <p:cTn id="15" presetID="1" presetClass="exit" presetSubtype="0" fill="hold" nodeType="clickEffect">
+                                  <p:stCondLst>
+                                    <p:cond delay="0"/>
+                                  </p:stCondLst>
+                                  <p:childTnLst>
+                                    <p:set>
+                                      <p:cBhvr>
+                                        <p:cTn id="16" dur="1" fill="hold">
+                                          <p:stCondLst>
+                                            <p:cond delay="0"/>
+                                          </p:stCondLst>
+                                        </p:cTn>
+                                        <p:tgtEl>
+                                          <p:spTgt spid="6"/>
+                                        </p:tgtEl>
+                                        <p:attrNameLst>
+                                          <p:attrName>style.visibility</p:attrName>
+                                        </p:attrNameLst>
+                                      </p:cBhvr>
+                                      <p:to>
+                                        <p:strVal val="hidden"/>
+                                      </p:to>
+                                    </p:set>
+                                  </p:childTnLst>
+                                </p:cTn>
+                              </p:par>
+                              <p:par>
+                                <p:cTn id="17" presetID="1" presetClass="entr" presetSubtype="0" fill="hold" nodeType="withEffect">
+                                  <p:stCondLst>
+                                    <p:cond delay="0"/>
+                                  </p:stCondLst>
+                                  <p:childTnLst>
+                                    <p:set>
+                                      <p:cBhvr>
+                                        <p:cTn id="18" dur="1" fill="hold">
+                                          <p:stCondLst>
+                                            <p:cond delay="0"/>
+                                          </p:stCondLst>
+                                        </p:cTn>
+                                        <p:tgtEl>
+                                          <p:spTgt spid="7"/>
+                                        </p:tgtEl>
+                                        <p:attrNameLst>
+                                          <p:attrName>style.visibility</p:attrName>
+                                        </p:attrNameLst>
+                                      </p:cBhvr>
+                                      <p:to>
+                                        <p:strVal val="visible"/>
+                                      </p:to>
+                                    </p:set>
+                                  </p:childTnLst>
+                                </p:cTn>
+                              </p:par>
+                            </p:childTnLst>
+                          </p:cTn>
+                        </p:par>
+                      </p:childTnLst>
+                    </p:cTn>
+                  </p:par>
+                  <p:par>
+                    <p:cTn id="19" fill="hold">
+                      <p:stCondLst>
+                        <p:cond delay="indefinite"/>
+                      </p:stCondLst>
+                      <p:childTnLst>
+                        <p:par>
+                          <p:cTn id="20" fill="hold">
+                            <p:stCondLst>
+                              <p:cond delay="0"/>
+                            </p:stCondLst>
+                            <p:childTnLst>
+                              <p:par>
+                                <p:cTn id="21" presetID="6" presetClass="emph" presetSubtype="0" fill="hold" nodeType="clickEffect">
+                                  <p:stCondLst>
+                                    <p:cond delay="0"/>
+                                  </p:stCondLst>
+                                  <p:childTnLst>
+                                    <p:animScale>
+                                      <p:cBhvr>
+                                        <p:cTn id="22" dur="2000" fill="hold"/>
+                                        <p:tgtEl>
+                                          <p:spTgt spid="7"/>
+                                        </p:tgtEl>
+                                      </p:cBhvr>
+                                      <p:by x="150000" y="150000"/>
+                                    </p:animScale>
+                                  </p:childTnLst>
+                                </p:cTn>
+                              </p:par>
+                            </p:childTnLst>
+                          </p:cTn>
+                        </p:par>
+                      </p:childTnLst>
+                    </p:cTn>
+                  </p:par>
+                </p:childTnLst>
+              </p:cTn>
+              <p:prevCondLst>
+                <p:cond evt="onPrev" delay="0">
+                  <p:tgtEl>
+                    <p:sldTgt/>
+                  </p:tgtEl>
+                </p:cond>
+              </p:prevCondLst>
+              <p:nextCondLst>
+                <p:cond evt="onNext" delay="0">
+                  <p:tgtEl>
+                    <p:sldTgt/>
+                  </p:tgtEl>
+                </p:cond>
+              </p:nextCondLst>
+            </p:seq>
+          </p:childTnLst>
+        </p:cTn>
+      </p:par>
+    </p:tnLst>
+  </p:timing>
+</p:sld>
+</file>
+
+<file path=ppt/slides/slide16.xml><?xml version="1.0" encoding="utf-8"?>
+<p:sld xmlns:a="http://schemas.openxmlformats.org/drawingml/2006/main" xmlns:r="http://schemas.openxmlformats.org/officeDocument/2006/relationships" xmlns:p="http://schemas.openxmlformats.org/presentationml/2006/main">
+  <p:cSld>
+    <p:spTree>
+      <p:nvGrpSpPr>
+        <p:cNvPr id="1" name=""/>
+        <p:cNvGrpSpPr/>
+        <p:nvPr/>
+      </p:nvGrpSpPr>
+      <p:grpSpPr>
+        <a:xfrm>
+          <a:off x="0" y="0"/>
+          <a:ext cx="0" cy="0"/>
+          <a:chOff x="0" y="0"/>
+          <a:chExt cx="0" cy="0"/>
+        </a:xfrm>
+      </p:grpSpPr>
       <p:pic>
         <p:nvPicPr>
           <p:cNvPr id="7" name="Tijdelijke aanduiding voor inhoud 6"/>
@@ -4743,7 +5234,7 @@
             <a:fld id="{3B80295F-48CD-49FC-897A-CCEC919B8070}" type="slidenum">
               <a:rPr lang="nl-BE" smtClean="0"/>
               <a:pPr/>
-              <a:t>15</a:t>
+              <a:t>16</a:t>
             </a:fld>
             <a:endParaRPr lang="nl-BE" dirty="0"/>
           </a:p>
@@ -4764,16 +5255,12 @@
           <a:bodyPr/>
           <a:lstStyle/>
           <a:p>
-            <a:endParaRPr lang="nl-BE" dirty="0"/>
-          </a:p>
-          <a:p>
-            <a:r>
-              <a:rPr lang="nl-BE" dirty="0" err="1"/>
-              <a:t>Logistic</a:t>
-            </a:r>
-            <a:r>
-              <a:rPr lang="nl-BE" dirty="0"/>
-              <a:t> Management Platform</a:t>
+            <a:endParaRPr lang="nl-BE"/>
+          </a:p>
+          <a:p>
+            <a:r>
+              <a:rPr lang="nl-BE"/>
+              <a:t>Logistic Management Platform</a:t>
             </a:r>
           </a:p>
           <a:p>
@@ -5045,7 +5532,7 @@
                                   <p:childTnLst>
                                     <p:animScale>
                                       <p:cBhvr>
-                                        <p:cTn id="17" dur="2000" fill="hold"/>
+                                        <p:cTn id="17" dur="500" fill="hold"/>
                                         <p:tgtEl>
                                           <p:spTgt spid="9"/>
                                         </p:tgtEl>
@@ -5089,194 +5576,6 @@
 </p:sld>
 </file>
 
-<file path=ppt/slides/slide16.xml><?xml version="1.0" encoding="utf-8"?>
-<p:sld xmlns:a="http://schemas.openxmlformats.org/drawingml/2006/main" xmlns:r="http://schemas.openxmlformats.org/officeDocument/2006/relationships" xmlns:p="http://schemas.openxmlformats.org/presentationml/2006/main">
-  <p:cSld>
-    <p:spTree>
-      <p:nvGrpSpPr>
-        <p:cNvPr id="1" name=""/>
-        <p:cNvGrpSpPr/>
-        <p:nvPr/>
-      </p:nvGrpSpPr>
-      <p:grpSpPr>
-        <a:xfrm>
-          <a:off x="0" y="0"/>
-          <a:ext cx="0" cy="0"/>
-          <a:chOff x="0" y="0"/>
-          <a:chExt cx="0" cy="0"/>
-        </a:xfrm>
-      </p:grpSpPr>
-      <p:sp>
-        <p:nvSpPr>
-          <p:cNvPr id="2" name="Content Placeholder 1"/>
-          <p:cNvSpPr>
-            <a:spLocks noGrp="1"/>
-          </p:cNvSpPr>
-          <p:nvPr>
-            <p:ph idx="1"/>
-          </p:nvPr>
-        </p:nvSpPr>
-        <p:spPr/>
-        <p:txBody>
-          <a:bodyPr/>
-          <a:lstStyle/>
-          <a:p>
-            <a:r>
-              <a:rPr lang="nl-BE" dirty="0"/>
-              <a:t>Password-</a:t>
-            </a:r>
-            <a:r>
-              <a:rPr lang="nl-BE" dirty="0" err="1"/>
-              <a:t>Based</a:t>
-            </a:r>
-            <a:r>
-              <a:rPr lang="nl-BE" dirty="0"/>
-              <a:t> </a:t>
-            </a:r>
-            <a:r>
-              <a:rPr lang="nl-BE" dirty="0" err="1"/>
-              <a:t>Key</a:t>
-            </a:r>
-            <a:r>
-              <a:rPr lang="nl-BE" dirty="0"/>
-              <a:t> </a:t>
-            </a:r>
-            <a:r>
-              <a:rPr lang="nl-BE" dirty="0" err="1"/>
-              <a:t>Derivation</a:t>
-            </a:r>
-            <a:r>
-              <a:rPr lang="nl-BE" dirty="0"/>
-              <a:t> </a:t>
-            </a:r>
-            <a:r>
-              <a:rPr lang="nl-BE" dirty="0" err="1"/>
-              <a:t>Function</a:t>
-            </a:r>
-            <a:endParaRPr lang="nl-BE" dirty="0"/>
-          </a:p>
-          <a:p>
-            <a:r>
-              <a:rPr lang="nl-BE" dirty="0"/>
-              <a:t>SHA256</a:t>
-            </a:r>
-          </a:p>
-          <a:p>
-            <a:r>
-              <a:rPr lang="nl-BE" dirty="0"/>
-              <a:t>Brute-force &amp; </a:t>
-            </a:r>
-            <a:r>
-              <a:rPr lang="nl-BE" dirty="0" err="1"/>
-              <a:t>dictionary</a:t>
-            </a:r>
-            <a:r>
-              <a:rPr lang="nl-BE" dirty="0"/>
-              <a:t> attacks minder effectief</a:t>
-            </a:r>
-          </a:p>
-          <a:p>
-            <a:r>
-              <a:rPr lang="nl-BE" dirty="0"/>
-              <a:t>Unieke </a:t>
-            </a:r>
-            <a:r>
-              <a:rPr lang="nl-BE" dirty="0" err="1"/>
-              <a:t>salt</a:t>
-            </a:r>
-            <a:endParaRPr lang="nl-BE" dirty="0"/>
-          </a:p>
-          <a:p>
-            <a:endParaRPr lang="en-GB" dirty="0"/>
-          </a:p>
-        </p:txBody>
-      </p:sp>
-      <p:sp>
-        <p:nvSpPr>
-          <p:cNvPr id="3" name="Title 2"/>
-          <p:cNvSpPr>
-            <a:spLocks noGrp="1"/>
-          </p:cNvSpPr>
-          <p:nvPr>
-            <p:ph type="title"/>
-          </p:nvPr>
-        </p:nvSpPr>
-        <p:spPr/>
-        <p:txBody>
-          <a:bodyPr/>
-          <a:lstStyle/>
-          <a:p>
-            <a:r>
-              <a:rPr lang="nl-BE" dirty="0"/>
-              <a:t>PBKDF2</a:t>
-            </a:r>
-            <a:endParaRPr lang="en-GB" dirty="0"/>
-          </a:p>
-        </p:txBody>
-      </p:sp>
-      <p:sp>
-        <p:nvSpPr>
-          <p:cNvPr id="4" name="Slide Number Placeholder 3"/>
-          <p:cNvSpPr>
-            <a:spLocks noGrp="1"/>
-          </p:cNvSpPr>
-          <p:nvPr>
-            <p:ph type="sldNum" sz="quarter" idx="11"/>
-          </p:nvPr>
-        </p:nvSpPr>
-        <p:spPr/>
-        <p:txBody>
-          <a:bodyPr/>
-          <a:lstStyle/>
-          <a:p>
-            <a:fld id="{3B80295F-48CD-49FC-897A-CCEC919B8070}" type="slidenum">
-              <a:rPr lang="nl-BE" smtClean="0"/>
-              <a:pPr/>
-              <a:t>16</a:t>
-            </a:fld>
-            <a:endParaRPr lang="nl-BE" dirty="0"/>
-          </a:p>
-        </p:txBody>
-      </p:sp>
-      <p:sp>
-        <p:nvSpPr>
-          <p:cNvPr id="5" name="Footer Placeholder 4"/>
-          <p:cNvSpPr>
-            <a:spLocks noGrp="1"/>
-          </p:cNvSpPr>
-          <p:nvPr>
-            <p:ph type="ftr" sz="quarter" idx="12"/>
-          </p:nvPr>
-        </p:nvSpPr>
-        <p:spPr/>
-        <p:txBody>
-          <a:bodyPr/>
-          <a:lstStyle/>
-          <a:p>
-            <a:r>
-              <a:rPr lang="nl-BE" dirty="0" err="1"/>
-              <a:t>Logistic</a:t>
-            </a:r>
-            <a:r>
-              <a:rPr lang="nl-BE" dirty="0"/>
-              <a:t> Management Platform</a:t>
-            </a:r>
-          </a:p>
-        </p:txBody>
-      </p:sp>
-    </p:spTree>
-    <p:extLst>
-      <p:ext uri="{BB962C8B-B14F-4D97-AF65-F5344CB8AC3E}">
-        <p14:creationId xmlns:p14="http://schemas.microsoft.com/office/powerpoint/2010/main" val="2972397824"/>
-      </p:ext>
-    </p:extLst>
-  </p:cSld>
-  <p:clrMapOvr>
-    <a:masterClrMapping/>
-  </p:clrMapOvr>
-</p:sld>
-</file>
-
 <file path=ppt/slides/slide17.xml><?xml version="1.0" encoding="utf-8"?>
 <p:sld xmlns:a="http://schemas.openxmlformats.org/drawingml/2006/main" xmlns:r="http://schemas.openxmlformats.org/officeDocument/2006/relationships" xmlns:p="http://schemas.openxmlformats.org/presentationml/2006/main">
   <p:cSld>
@@ -5309,7 +5608,73 @@
           <a:bodyPr/>
           <a:lstStyle/>
           <a:p>
-            <a:endParaRPr lang="en-GB"/>
+            <a:r>
+              <a:rPr lang="nl-BE" dirty="0"/>
+              <a:t>Password-</a:t>
+            </a:r>
+            <a:r>
+              <a:rPr lang="nl-BE" dirty="0" err="1"/>
+              <a:t>Based</a:t>
+            </a:r>
+            <a:r>
+              <a:rPr lang="nl-BE" dirty="0"/>
+              <a:t> </a:t>
+            </a:r>
+            <a:r>
+              <a:rPr lang="nl-BE" dirty="0" err="1"/>
+              <a:t>Key</a:t>
+            </a:r>
+            <a:r>
+              <a:rPr lang="nl-BE" dirty="0"/>
+              <a:t> </a:t>
+            </a:r>
+            <a:r>
+              <a:rPr lang="nl-BE" dirty="0" err="1"/>
+              <a:t>Derivation</a:t>
+            </a:r>
+            <a:r>
+              <a:rPr lang="nl-BE" dirty="0"/>
+              <a:t> </a:t>
+            </a:r>
+            <a:r>
+              <a:rPr lang="nl-BE" dirty="0" err="1"/>
+              <a:t>Function</a:t>
+            </a:r>
+            <a:endParaRPr lang="nl-BE" dirty="0"/>
+          </a:p>
+          <a:p>
+            <a:r>
+              <a:rPr lang="nl-BE" dirty="0"/>
+              <a:t>SHA256</a:t>
+            </a:r>
+          </a:p>
+          <a:p>
+            <a:r>
+              <a:rPr lang="nl-BE" dirty="0"/>
+              <a:t>Brute-force &amp; </a:t>
+            </a:r>
+            <a:r>
+              <a:rPr lang="nl-BE" dirty="0" err="1"/>
+              <a:t>dictionary</a:t>
+            </a:r>
+            <a:r>
+              <a:rPr lang="nl-BE" dirty="0"/>
+              <a:t> attacks minder effectief</a:t>
+            </a:r>
+          </a:p>
+          <a:p>
+            <a:r>
+              <a:rPr lang="nl-BE" dirty="0"/>
+              <a:t>Unieke </a:t>
+            </a:r>
+            <a:r>
+              <a:rPr lang="nl-BE" dirty="0" err="1"/>
+              <a:t>salt</a:t>
+            </a:r>
+            <a:endParaRPr lang="nl-BE" dirty="0"/>
+          </a:p>
+          <a:p>
+            <a:endParaRPr lang="en-GB" dirty="0"/>
           </a:p>
         </p:txBody>
       </p:sp>
@@ -5329,9 +5694,10 @@
           <a:lstStyle/>
           <a:p>
             <a:r>
-              <a:rPr lang="en-GB" dirty="0"/>
+              <a:rPr lang="nl-BE" dirty="0"/>
               <a:t>PBKDF2</a:t>
             </a:r>
+            <a:endParaRPr lang="en-GB" dirty="0"/>
           </a:p>
         </p:txBody>
       </p:sp>
@@ -5354,6 +5720,127 @@
               <a:rPr lang="nl-BE" smtClean="0"/>
               <a:pPr/>
               <a:t>17</a:t>
+            </a:fld>
+            <a:endParaRPr lang="nl-BE" dirty="0"/>
+          </a:p>
+        </p:txBody>
+      </p:sp>
+      <p:sp>
+        <p:nvSpPr>
+          <p:cNvPr id="5" name="Footer Placeholder 4"/>
+          <p:cNvSpPr>
+            <a:spLocks noGrp="1"/>
+          </p:cNvSpPr>
+          <p:nvPr>
+            <p:ph type="ftr" sz="quarter" idx="12"/>
+          </p:nvPr>
+        </p:nvSpPr>
+        <p:spPr/>
+        <p:txBody>
+          <a:bodyPr/>
+          <a:lstStyle/>
+          <a:p>
+            <a:r>
+              <a:rPr lang="nl-BE" dirty="0" err="1"/>
+              <a:t>Logistic</a:t>
+            </a:r>
+            <a:r>
+              <a:rPr lang="nl-BE" dirty="0"/>
+              <a:t> Management Platform</a:t>
+            </a:r>
+          </a:p>
+        </p:txBody>
+      </p:sp>
+    </p:spTree>
+    <p:extLst>
+      <p:ext uri="{BB962C8B-B14F-4D97-AF65-F5344CB8AC3E}">
+        <p14:creationId xmlns:p14="http://schemas.microsoft.com/office/powerpoint/2010/main" val="2972397824"/>
+      </p:ext>
+    </p:extLst>
+  </p:cSld>
+  <p:clrMapOvr>
+    <a:masterClrMapping/>
+  </p:clrMapOvr>
+</p:sld>
+</file>
+
+<file path=ppt/slides/slide18.xml><?xml version="1.0" encoding="utf-8"?>
+<p:sld xmlns:a="http://schemas.openxmlformats.org/drawingml/2006/main" xmlns:r="http://schemas.openxmlformats.org/officeDocument/2006/relationships" xmlns:p="http://schemas.openxmlformats.org/presentationml/2006/main">
+  <p:cSld>
+    <p:spTree>
+      <p:nvGrpSpPr>
+        <p:cNvPr id="1" name=""/>
+        <p:cNvGrpSpPr/>
+        <p:nvPr/>
+      </p:nvGrpSpPr>
+      <p:grpSpPr>
+        <a:xfrm>
+          <a:off x="0" y="0"/>
+          <a:ext cx="0" cy="0"/>
+          <a:chOff x="0" y="0"/>
+          <a:chExt cx="0" cy="0"/>
+        </a:xfrm>
+      </p:grpSpPr>
+      <p:sp>
+        <p:nvSpPr>
+          <p:cNvPr id="2" name="Content Placeholder 1"/>
+          <p:cNvSpPr>
+            <a:spLocks noGrp="1"/>
+          </p:cNvSpPr>
+          <p:nvPr>
+            <p:ph idx="1"/>
+          </p:nvPr>
+        </p:nvSpPr>
+        <p:spPr/>
+        <p:txBody>
+          <a:bodyPr/>
+          <a:lstStyle/>
+          <a:p>
+            <a:endParaRPr lang="en-GB"/>
+          </a:p>
+        </p:txBody>
+      </p:sp>
+      <p:sp>
+        <p:nvSpPr>
+          <p:cNvPr id="3" name="Title 2"/>
+          <p:cNvSpPr>
+            <a:spLocks noGrp="1"/>
+          </p:cNvSpPr>
+          <p:nvPr>
+            <p:ph type="title"/>
+          </p:nvPr>
+        </p:nvSpPr>
+        <p:spPr/>
+        <p:txBody>
+          <a:bodyPr/>
+          <a:lstStyle/>
+          <a:p>
+            <a:r>
+              <a:rPr lang="en-GB" dirty="0"/>
+              <a:t>PBKDF2</a:t>
+            </a:r>
+          </a:p>
+        </p:txBody>
+      </p:sp>
+      <p:sp>
+        <p:nvSpPr>
+          <p:cNvPr id="4" name="Slide Number Placeholder 3"/>
+          <p:cNvSpPr>
+            <a:spLocks noGrp="1"/>
+          </p:cNvSpPr>
+          <p:nvPr>
+            <p:ph type="sldNum" sz="quarter" idx="11"/>
+          </p:nvPr>
+        </p:nvSpPr>
+        <p:spPr/>
+        <p:txBody>
+          <a:bodyPr/>
+          <a:lstStyle/>
+          <a:p>
+            <a:fld id="{3B80295F-48CD-49FC-897A-CCEC919B8070}" type="slidenum">
+              <a:rPr lang="nl-BE" smtClean="0"/>
+              <a:pPr/>
+              <a:t>18</a:t>
             </a:fld>
             <a:endParaRPr lang="nl-BE" dirty="0"/>
           </a:p>
@@ -5428,7 +5915,7 @@
 </p:sld>
 </file>
 
-<file path=ppt/slides/slide18.xml><?xml version="1.0" encoding="utf-8"?>
+<file path=ppt/slides/slide19.xml><?xml version="1.0" encoding="utf-8"?>
 <p:sld xmlns:a="http://schemas.openxmlformats.org/drawingml/2006/main" xmlns:r="http://schemas.openxmlformats.org/officeDocument/2006/relationships" xmlns:p="http://schemas.openxmlformats.org/presentationml/2006/main">
   <p:cSld>
     <p:spTree>
@@ -5485,7 +5972,7 @@
             <a:fld id="{3B80295F-48CD-49FC-897A-CCEC919B8070}" type="slidenum">
               <a:rPr lang="nl-BE" smtClean="0"/>
               <a:pPr/>
-              <a:t>18</a:t>
+              <a:t>19</a:t>
             </a:fld>
             <a:endParaRPr lang="nl-BE" dirty="0"/>
           </a:p>
@@ -5572,201 +6059,6 @@
 </p:sld>
 </file>
 
-<file path=ppt/slides/slide19.xml><?xml version="1.0" encoding="utf-8"?>
-<p:sld xmlns:a="http://schemas.openxmlformats.org/drawingml/2006/main" xmlns:r="http://schemas.openxmlformats.org/officeDocument/2006/relationships" xmlns:p="http://schemas.openxmlformats.org/presentationml/2006/main">
-  <p:cSld>
-    <p:spTree>
-      <p:nvGrpSpPr>
-        <p:cNvPr id="1" name=""/>
-        <p:cNvGrpSpPr/>
-        <p:nvPr/>
-      </p:nvGrpSpPr>
-      <p:grpSpPr>
-        <a:xfrm>
-          <a:off x="0" y="0"/>
-          <a:ext cx="0" cy="0"/>
-          <a:chOff x="0" y="0"/>
-          <a:chExt cx="0" cy="0"/>
-        </a:xfrm>
-      </p:grpSpPr>
-      <p:sp>
-        <p:nvSpPr>
-          <p:cNvPr id="2" name="Content Placeholder 1"/>
-          <p:cNvSpPr>
-            <a:spLocks noGrp="1"/>
-          </p:cNvSpPr>
-          <p:nvPr>
-            <p:ph idx="1"/>
-          </p:nvPr>
-        </p:nvSpPr>
-        <p:spPr/>
-        <p:txBody>
-          <a:bodyPr/>
-          <a:lstStyle/>
-          <a:p>
-            <a:pPr marL="514350" indent="-514350">
-              <a:buFont typeface="+mj-lt"/>
-              <a:buAutoNum type="arabicPeriod"/>
-            </a:pPr>
-            <a:r>
-              <a:rPr lang="en-GB" dirty="0" err="1"/>
-              <a:t>Webinterface</a:t>
-            </a:r>
-            <a:endParaRPr lang="en-GB" dirty="0"/>
-          </a:p>
-          <a:p>
-            <a:pPr marL="514350" indent="-514350">
-              <a:buFont typeface="+mj-lt"/>
-              <a:buAutoNum type="arabicPeriod"/>
-            </a:pPr>
-            <a:r>
-              <a:rPr lang="en-GB" dirty="0" err="1"/>
-              <a:t>Technologieën</a:t>
-            </a:r>
-            <a:endParaRPr lang="en-GB" dirty="0"/>
-          </a:p>
-          <a:p>
-            <a:pPr marL="514350" indent="-514350">
-              <a:buFont typeface="+mj-lt"/>
-              <a:buAutoNum type="arabicPeriod"/>
-            </a:pPr>
-            <a:r>
-              <a:rPr lang="en-GB" dirty="0" err="1">
-                <a:solidFill>
-                  <a:srgbClr val="00A0AE"/>
-                </a:solidFill>
-              </a:rPr>
-              <a:t>Conclusie</a:t>
-            </a:r>
-            <a:endParaRPr lang="en-GB" dirty="0">
-              <a:solidFill>
-                <a:srgbClr val="00A0AE"/>
-              </a:solidFill>
-            </a:endParaRPr>
-          </a:p>
-          <a:p>
-            <a:pPr marL="514350" indent="-514350">
-              <a:buFont typeface="+mj-lt"/>
-              <a:buAutoNum type="arabicPeriod"/>
-            </a:pPr>
-            <a:r>
-              <a:rPr lang="en-GB" dirty="0"/>
-              <a:t>Demo</a:t>
-            </a:r>
-          </a:p>
-          <a:p>
-            <a:pPr marL="514350" indent="-514350">
-              <a:buFont typeface="+mj-lt"/>
-              <a:buAutoNum type="arabicPeriod"/>
-            </a:pPr>
-            <a:r>
-              <a:rPr lang="en-GB" dirty="0" err="1"/>
-              <a:t>Vragen</a:t>
-            </a:r>
-            <a:endParaRPr lang="en-GB" dirty="0"/>
-          </a:p>
-          <a:p>
-            <a:pPr marL="914400" lvl="1" indent="-514350">
-              <a:buFont typeface="+mj-lt"/>
-              <a:buAutoNum type="arabicPeriod"/>
-            </a:pPr>
-            <a:endParaRPr lang="en-GB" dirty="0"/>
-          </a:p>
-          <a:p>
-            <a:pPr marL="914400" lvl="1" indent="-514350">
-              <a:buFont typeface="+mj-lt"/>
-              <a:buAutoNum type="arabicPeriod"/>
-            </a:pPr>
-            <a:endParaRPr lang="en-GB" dirty="0"/>
-          </a:p>
-        </p:txBody>
-      </p:sp>
-      <p:sp>
-        <p:nvSpPr>
-          <p:cNvPr id="3" name="Title 2"/>
-          <p:cNvSpPr>
-            <a:spLocks noGrp="1"/>
-          </p:cNvSpPr>
-          <p:nvPr>
-            <p:ph type="title"/>
-          </p:nvPr>
-        </p:nvSpPr>
-        <p:spPr/>
-        <p:txBody>
-          <a:bodyPr/>
-          <a:lstStyle/>
-          <a:p>
-            <a:r>
-              <a:rPr lang="en-GB" dirty="0" err="1"/>
-              <a:t>Overzicht</a:t>
-            </a:r>
-            <a:endParaRPr lang="en-GB" dirty="0"/>
-          </a:p>
-        </p:txBody>
-      </p:sp>
-      <p:sp>
-        <p:nvSpPr>
-          <p:cNvPr id="4" name="Slide Number Placeholder 3"/>
-          <p:cNvSpPr>
-            <a:spLocks noGrp="1"/>
-          </p:cNvSpPr>
-          <p:nvPr>
-            <p:ph type="sldNum" sz="quarter" idx="11"/>
-          </p:nvPr>
-        </p:nvSpPr>
-        <p:spPr/>
-        <p:txBody>
-          <a:bodyPr/>
-          <a:lstStyle/>
-          <a:p>
-            <a:fld id="{3B80295F-48CD-49FC-897A-CCEC919B8070}" type="slidenum">
-              <a:rPr lang="nl-BE" smtClean="0"/>
-              <a:pPr/>
-              <a:t>19</a:t>
-            </a:fld>
-            <a:endParaRPr lang="nl-BE" dirty="0"/>
-          </a:p>
-        </p:txBody>
-      </p:sp>
-      <p:sp>
-        <p:nvSpPr>
-          <p:cNvPr id="5" name="Footer Placeholder 4"/>
-          <p:cNvSpPr>
-            <a:spLocks noGrp="1"/>
-          </p:cNvSpPr>
-          <p:nvPr>
-            <p:ph type="ftr" sz="quarter" idx="12"/>
-          </p:nvPr>
-        </p:nvSpPr>
-        <p:spPr/>
-        <p:txBody>
-          <a:bodyPr/>
-          <a:lstStyle/>
-          <a:p>
-            <a:r>
-              <a:rPr lang="nl-BE" dirty="0" err="1"/>
-              <a:t>Logistic</a:t>
-            </a:r>
-            <a:r>
-              <a:rPr lang="nl-BE" dirty="0"/>
-              <a:t> Management Platform</a:t>
-            </a:r>
-          </a:p>
-        </p:txBody>
-      </p:sp>
-    </p:spTree>
-    <p:extLst>
-      <p:ext uri="{BB962C8B-B14F-4D97-AF65-F5344CB8AC3E}">
-        <p14:creationId xmlns:p14="http://schemas.microsoft.com/office/powerpoint/2010/main" val="1060766476"/>
-      </p:ext>
-    </p:extLst>
-  </p:cSld>
-  <p:clrMapOvr>
-    <a:masterClrMapping/>
-  </p:clrMapOvr>
-</p:sld>
-</file>
-
 <file path=ppt/slides/slide2.xml><?xml version="1.0" encoding="utf-8"?>
 <p:sld xmlns:a="http://schemas.openxmlformats.org/drawingml/2006/main" xmlns:r="http://schemas.openxmlformats.org/officeDocument/2006/relationships" xmlns:p="http://schemas.openxmlformats.org/presentationml/2006/main">
   <p:cSld>
@@ -5925,7 +6217,7 @@
       </p:grpSpPr>
       <p:sp>
         <p:nvSpPr>
-          <p:cNvPr id="6" name="Tijdelijke aanduiding voor inhoud 5"/>
+          <p:cNvPr id="2" name="Content Placeholder 1"/>
           <p:cNvSpPr>
             <a:spLocks noGrp="1"/>
           </p:cNvSpPr>
@@ -5938,35 +6230,80 @@
           <a:bodyPr/>
           <a:lstStyle/>
           <a:p>
-            <a:r>
-              <a:rPr lang="nl-BE" dirty="0"/>
-              <a:t>Geslaagd</a:t>
-            </a:r>
-          </a:p>
-          <a:p>
-            <a:r>
-              <a:rPr lang="nl-BE" dirty="0" err="1"/>
-              <a:t>Admin</a:t>
-            </a:r>
-            <a:r>
-              <a:rPr lang="nl-BE" dirty="0"/>
-              <a:t> gebruiker herzien</a:t>
-            </a:r>
-          </a:p>
-          <a:p>
-            <a:r>
-              <a:rPr lang="nl-BE" dirty="0"/>
-              <a:t>Email op eigen domein </a:t>
-            </a:r>
-          </a:p>
-          <a:p>
-            <a:r>
-              <a:rPr lang="nl-BE" dirty="0"/>
-              <a:t>Feedback van de sector was positief</a:t>
-            </a:r>
-          </a:p>
-          <a:p>
-            <a:endParaRPr lang="nl-BE" dirty="0"/>
+            <a:pPr marL="514350" indent="-514350">
+              <a:buFont typeface="+mj-lt"/>
+              <a:buAutoNum type="arabicPeriod"/>
+            </a:pPr>
+            <a:r>
+              <a:rPr lang="en-GB" dirty="0" err="1"/>
+              <a:t>Webinterface</a:t>
+            </a:r>
+            <a:endParaRPr lang="en-GB" dirty="0"/>
+          </a:p>
+          <a:p>
+            <a:pPr marL="514350" indent="-514350">
+              <a:buFont typeface="+mj-lt"/>
+              <a:buAutoNum type="arabicPeriod"/>
+            </a:pPr>
+            <a:r>
+              <a:rPr lang="en-GB" dirty="0" err="1"/>
+              <a:t>Technologieën</a:t>
+            </a:r>
+            <a:endParaRPr lang="en-GB" dirty="0"/>
+          </a:p>
+          <a:p>
+            <a:pPr marL="514350" indent="-514350">
+              <a:buFont typeface="+mj-lt"/>
+              <a:buAutoNum type="arabicPeriod"/>
+            </a:pPr>
+            <a:r>
+              <a:rPr lang="en-GB" dirty="0" err="1">
+                <a:solidFill>
+                  <a:srgbClr val="00A0AE"/>
+                </a:solidFill>
+              </a:rPr>
+              <a:t>Conclusie</a:t>
+            </a:r>
+            <a:endParaRPr lang="en-GB" dirty="0">
+              <a:solidFill>
+                <a:srgbClr val="00A0AE"/>
+              </a:solidFill>
+            </a:endParaRPr>
+          </a:p>
+          <a:p>
+            <a:pPr marL="514350" indent="-514350">
+              <a:buFont typeface="+mj-lt"/>
+              <a:buAutoNum type="arabicPeriod"/>
+            </a:pPr>
+            <a:r>
+              <a:rPr lang="en-GB" dirty="0"/>
+              <a:t>Demo</a:t>
+            </a:r>
+          </a:p>
+          <a:p>
+            <a:pPr marL="514350" indent="-514350">
+              <a:buFont typeface="+mj-lt"/>
+              <a:buAutoNum type="arabicPeriod"/>
+            </a:pPr>
+            <a:r>
+              <a:rPr lang="en-GB" dirty="0" err="1"/>
+              <a:t>Vragen</a:t>
+            </a:r>
+            <a:endParaRPr lang="en-GB" dirty="0"/>
+          </a:p>
+          <a:p>
+            <a:pPr marL="914400" lvl="1" indent="-514350">
+              <a:buFont typeface="+mj-lt"/>
+              <a:buAutoNum type="arabicPeriod"/>
+            </a:pPr>
+            <a:endParaRPr lang="en-GB" dirty="0"/>
+          </a:p>
+          <a:p>
+            <a:pPr marL="914400" lvl="1" indent="-514350">
+              <a:buFont typeface="+mj-lt"/>
+              <a:buAutoNum type="arabicPeriod"/>
+            </a:pPr>
+            <a:endParaRPr lang="en-GB" dirty="0"/>
           </a:p>
         </p:txBody>
       </p:sp>
@@ -5986,8 +6323,8 @@
           <a:lstStyle/>
           <a:p>
             <a:r>
-              <a:rPr lang="en-GB"/>
-              <a:t>CONCLUSIE</a:t>
+              <a:rPr lang="en-GB" dirty="0" err="1"/>
+              <a:t>Overzicht</a:t>
             </a:r>
             <a:endParaRPr lang="en-GB" dirty="0"/>
           </a:p>
@@ -6032,23 +6369,21 @@
           <a:bodyPr/>
           <a:lstStyle/>
           <a:p>
-            <a:endParaRPr lang="nl-BE"/>
-          </a:p>
-          <a:p>
-            <a:r>
-              <a:rPr lang="nl-BE"/>
-              <a:t>Logistic Management Platform</a:t>
-            </a:r>
-          </a:p>
-          <a:p>
-            <a:endParaRPr lang="nl-BE" dirty="0"/>
+            <a:r>
+              <a:rPr lang="nl-BE" dirty="0" err="1"/>
+              <a:t>Logistic</a:t>
+            </a:r>
+            <a:r>
+              <a:rPr lang="nl-BE" dirty="0"/>
+              <a:t> Management Platform</a:t>
+            </a:r>
           </a:p>
         </p:txBody>
       </p:sp>
     </p:spTree>
     <p:extLst>
       <p:ext uri="{BB962C8B-B14F-4D97-AF65-F5344CB8AC3E}">
-        <p14:creationId xmlns:p14="http://schemas.microsoft.com/office/powerpoint/2010/main" val="3231994557"/>
+        <p14:creationId xmlns:p14="http://schemas.microsoft.com/office/powerpoint/2010/main" val="1060766476"/>
       </p:ext>
     </p:extLst>
   </p:cSld>
@@ -6077,7 +6412,7 @@
       </p:grpSpPr>
       <p:sp>
         <p:nvSpPr>
-          <p:cNvPr id="2" name="Content Placeholder 1"/>
+          <p:cNvPr id="6" name="Tijdelijke aanduiding voor inhoud 5"/>
           <p:cNvSpPr>
             <a:spLocks noGrp="1"/>
           </p:cNvSpPr>
@@ -6090,76 +6425,35 @@
           <a:bodyPr/>
           <a:lstStyle/>
           <a:p>
-            <a:pPr marL="514350" indent="-514350">
-              <a:buFont typeface="+mj-lt"/>
-              <a:buAutoNum type="arabicPeriod"/>
-            </a:pPr>
-            <a:r>
-              <a:rPr lang="en-GB" dirty="0" err="1"/>
-              <a:t>Webinterface</a:t>
-            </a:r>
-            <a:endParaRPr lang="en-GB" dirty="0"/>
-          </a:p>
-          <a:p>
-            <a:pPr marL="514350" indent="-514350">
-              <a:buFont typeface="+mj-lt"/>
-              <a:buAutoNum type="arabicPeriod"/>
-            </a:pPr>
-            <a:r>
-              <a:rPr lang="en-GB" dirty="0" err="1"/>
-              <a:t>Technologieën</a:t>
-            </a:r>
-            <a:endParaRPr lang="en-GB" dirty="0"/>
-          </a:p>
-          <a:p>
-            <a:pPr marL="514350" indent="-514350">
-              <a:buFont typeface="+mj-lt"/>
-              <a:buAutoNum type="arabicPeriod"/>
-            </a:pPr>
-            <a:r>
-              <a:rPr lang="en-GB" dirty="0" err="1"/>
-              <a:t>Conclusie</a:t>
-            </a:r>
-            <a:endParaRPr lang="en-GB" dirty="0"/>
-          </a:p>
-          <a:p>
-            <a:pPr marL="514350" indent="-514350">
-              <a:buFont typeface="+mj-lt"/>
-              <a:buAutoNum type="arabicPeriod"/>
-            </a:pPr>
-            <a:r>
-              <a:rPr lang="en-GB" dirty="0">
-                <a:solidFill>
-                  <a:srgbClr val="00A0AE"/>
-                </a:solidFill>
-              </a:rPr>
-              <a:t>Demo</a:t>
-            </a:r>
-          </a:p>
-          <a:p>
-            <a:pPr marL="514350" indent="-514350">
-              <a:buFont typeface="+mj-lt"/>
-              <a:buAutoNum type="arabicPeriod"/>
-            </a:pPr>
-            <a:r>
-              <a:rPr lang="en-GB" dirty="0" err="1"/>
-              <a:t>Vragen</a:t>
-            </a:r>
-            <a:endParaRPr lang="en-GB" dirty="0"/>
-          </a:p>
-          <a:p>
-            <a:pPr marL="914400" lvl="1" indent="-514350">
-              <a:buFont typeface="+mj-lt"/>
-              <a:buAutoNum type="arabicPeriod"/>
-            </a:pPr>
-            <a:endParaRPr lang="en-GB" dirty="0"/>
-          </a:p>
-          <a:p>
-            <a:pPr marL="914400" lvl="1" indent="-514350">
-              <a:buFont typeface="+mj-lt"/>
-              <a:buAutoNum type="arabicPeriod"/>
-            </a:pPr>
-            <a:endParaRPr lang="en-GB" dirty="0"/>
+            <a:r>
+              <a:rPr lang="nl-BE" dirty="0"/>
+              <a:t>Geslaagd</a:t>
+            </a:r>
+          </a:p>
+          <a:p>
+            <a:r>
+              <a:rPr lang="nl-BE" dirty="0" err="1"/>
+              <a:t>Admin</a:t>
+            </a:r>
+            <a:r>
+              <a:rPr lang="nl-BE" dirty="0"/>
+              <a:t> gebruiker herzien</a:t>
+            </a:r>
+          </a:p>
+          <a:p>
+            <a:r>
+              <a:rPr lang="nl-BE" dirty="0"/>
+              <a:t>Email op eigen domein </a:t>
+            </a:r>
+          </a:p>
+          <a:p>
+            <a:r>
+              <a:rPr lang="nl-BE" dirty="0"/>
+              <a:t>Feedback van de sector was positief</a:t>
+            </a:r>
+          </a:p>
+          <a:p>
+            <a:endParaRPr lang="nl-BE" dirty="0"/>
           </a:p>
         </p:txBody>
       </p:sp>
@@ -6179,8 +6473,8 @@
           <a:lstStyle/>
           <a:p>
             <a:r>
-              <a:rPr lang="en-GB" dirty="0" err="1"/>
-              <a:t>Overzicht</a:t>
+              <a:rPr lang="en-GB"/>
+              <a:t>CONCLUSIE</a:t>
             </a:r>
             <a:endParaRPr lang="en-GB" dirty="0"/>
           </a:p>
@@ -6225,21 +6519,23 @@
           <a:bodyPr/>
           <a:lstStyle/>
           <a:p>
-            <a:r>
-              <a:rPr lang="nl-BE" dirty="0" err="1"/>
-              <a:t>Logistic</a:t>
-            </a:r>
-            <a:r>
-              <a:rPr lang="nl-BE" dirty="0"/>
-              <a:t> Management Platform</a:t>
-            </a:r>
+            <a:endParaRPr lang="nl-BE"/>
+          </a:p>
+          <a:p>
+            <a:r>
+              <a:rPr lang="nl-BE"/>
+              <a:t>Logistic Management Platform</a:t>
+            </a:r>
+          </a:p>
+          <a:p>
+            <a:endParaRPr lang="nl-BE" dirty="0"/>
           </a:p>
         </p:txBody>
       </p:sp>
     </p:spTree>
     <p:extLst>
       <p:ext uri="{BB962C8B-B14F-4D97-AF65-F5344CB8AC3E}">
-        <p14:creationId xmlns:p14="http://schemas.microsoft.com/office/powerpoint/2010/main" val="4080855274"/>
+        <p14:creationId xmlns:p14="http://schemas.microsoft.com/office/powerpoint/2010/main" val="3231994557"/>
       </p:ext>
     </p:extLst>
   </p:cSld>
@@ -6319,7 +6615,11 @@
               <a:buAutoNum type="arabicPeriod"/>
             </a:pPr>
             <a:r>
-              <a:rPr lang="en-GB" dirty="0"/>
+              <a:rPr lang="en-GB" dirty="0">
+                <a:solidFill>
+                  <a:srgbClr val="00A0AE"/>
+                </a:solidFill>
+              </a:rPr>
               <a:t>Demo</a:t>
             </a:r>
           </a:p>
@@ -6329,18 +6629,10 @@
               <a:buAutoNum type="arabicPeriod"/>
             </a:pPr>
             <a:r>
-              <a:rPr lang="en-GB" dirty="0" err="1">
-                <a:solidFill>
-                  <a:srgbClr val="00A0AE"/>
-                </a:solidFill>
-              </a:rPr>
+              <a:rPr lang="en-GB" dirty="0" err="1"/>
               <a:t>Vragen</a:t>
             </a:r>
-            <a:endParaRPr lang="en-GB" dirty="0">
-              <a:solidFill>
-                <a:srgbClr val="00A0AE"/>
-              </a:solidFill>
-            </a:endParaRPr>
+            <a:endParaRPr lang="en-GB" dirty="0"/>
           </a:p>
           <a:p>
             <a:pPr marL="914400" lvl="1" indent="-514350">
@@ -6434,7 +6726,7 @@
     </p:spTree>
     <p:extLst>
       <p:ext uri="{BB962C8B-B14F-4D97-AF65-F5344CB8AC3E}">
-        <p14:creationId xmlns:p14="http://schemas.microsoft.com/office/powerpoint/2010/main" val="3465112707"/>
+        <p14:creationId xmlns:p14="http://schemas.microsoft.com/office/powerpoint/2010/main" val="4080855274"/>
       </p:ext>
     </p:extLst>
   </p:cSld>
@@ -6476,7 +6768,80 @@
           <a:bodyPr/>
           <a:lstStyle/>
           <a:p>
-            <a:endParaRPr lang="en-GB"/>
+            <a:pPr marL="514350" indent="-514350">
+              <a:buFont typeface="+mj-lt"/>
+              <a:buAutoNum type="arabicPeriod"/>
+            </a:pPr>
+            <a:r>
+              <a:rPr lang="en-GB" dirty="0" err="1"/>
+              <a:t>Webinterface</a:t>
+            </a:r>
+            <a:endParaRPr lang="en-GB" dirty="0"/>
+          </a:p>
+          <a:p>
+            <a:pPr marL="514350" indent="-514350">
+              <a:buFont typeface="+mj-lt"/>
+              <a:buAutoNum type="arabicPeriod"/>
+            </a:pPr>
+            <a:r>
+              <a:rPr lang="en-GB" dirty="0" err="1"/>
+              <a:t>Technologieën</a:t>
+            </a:r>
+            <a:endParaRPr lang="en-GB" dirty="0"/>
+          </a:p>
+          <a:p>
+            <a:pPr marL="514350" indent="-514350">
+              <a:buFont typeface="+mj-lt"/>
+              <a:buAutoNum type="arabicPeriod"/>
+            </a:pPr>
+            <a:r>
+              <a:rPr lang="en-GB" dirty="0" err="1"/>
+              <a:t>Conclusie</a:t>
+            </a:r>
+            <a:endParaRPr lang="en-GB" dirty="0"/>
+          </a:p>
+          <a:p>
+            <a:pPr marL="514350" indent="-514350">
+              <a:buFont typeface="+mj-lt"/>
+              <a:buAutoNum type="arabicPeriod"/>
+            </a:pPr>
+            <a:r>
+              <a:rPr lang="en-GB" dirty="0"/>
+              <a:t>Demo</a:t>
+            </a:r>
+          </a:p>
+          <a:p>
+            <a:pPr marL="514350" indent="-514350">
+              <a:buFont typeface="+mj-lt"/>
+              <a:buAutoNum type="arabicPeriod"/>
+            </a:pPr>
+            <a:r>
+              <a:rPr lang="en-GB" dirty="0" err="1">
+                <a:solidFill>
+                  <a:srgbClr val="00A0AE"/>
+                </a:solidFill>
+              </a:rPr>
+              <a:t>Vragen</a:t>
+            </a:r>
+            <a:endParaRPr lang="en-GB" dirty="0">
+              <a:solidFill>
+                <a:srgbClr val="00A0AE"/>
+              </a:solidFill>
+            </a:endParaRPr>
+          </a:p>
+          <a:p>
+            <a:pPr marL="914400" lvl="1" indent="-514350">
+              <a:buFont typeface="+mj-lt"/>
+              <a:buAutoNum type="arabicPeriod"/>
+            </a:pPr>
+            <a:endParaRPr lang="en-GB" dirty="0"/>
+          </a:p>
+          <a:p>
+            <a:pPr marL="914400" lvl="1" indent="-514350">
+              <a:buFont typeface="+mj-lt"/>
+              <a:buAutoNum type="arabicPeriod"/>
+            </a:pPr>
+            <a:endParaRPr lang="en-GB" dirty="0"/>
           </a:p>
         </p:txBody>
       </p:sp>
@@ -6497,12 +6862,9 @@
           <a:p>
             <a:r>
               <a:rPr lang="en-GB" dirty="0" err="1"/>
-              <a:t>Vragen</a:t>
-            </a:r>
-            <a:r>
-              <a:rPr lang="en-GB" dirty="0"/>
-              <a:t>?</a:t>
-            </a:r>
+              <a:t>Overzicht</a:t>
+            </a:r>
+            <a:endParaRPr lang="en-GB" dirty="0"/>
           </a:p>
         </p:txBody>
       </p:sp>
@@ -6525,6 +6887,131 @@
               <a:rPr lang="nl-BE" smtClean="0"/>
               <a:pPr/>
               <a:t>23</a:t>
+            </a:fld>
+            <a:endParaRPr lang="nl-BE" dirty="0"/>
+          </a:p>
+        </p:txBody>
+      </p:sp>
+      <p:sp>
+        <p:nvSpPr>
+          <p:cNvPr id="5" name="Footer Placeholder 4"/>
+          <p:cNvSpPr>
+            <a:spLocks noGrp="1"/>
+          </p:cNvSpPr>
+          <p:nvPr>
+            <p:ph type="ftr" sz="quarter" idx="12"/>
+          </p:nvPr>
+        </p:nvSpPr>
+        <p:spPr/>
+        <p:txBody>
+          <a:bodyPr/>
+          <a:lstStyle/>
+          <a:p>
+            <a:r>
+              <a:rPr lang="nl-BE" dirty="0" err="1"/>
+              <a:t>Logistic</a:t>
+            </a:r>
+            <a:r>
+              <a:rPr lang="nl-BE" dirty="0"/>
+              <a:t> Management Platform</a:t>
+            </a:r>
+          </a:p>
+        </p:txBody>
+      </p:sp>
+    </p:spTree>
+    <p:extLst>
+      <p:ext uri="{BB962C8B-B14F-4D97-AF65-F5344CB8AC3E}">
+        <p14:creationId xmlns:p14="http://schemas.microsoft.com/office/powerpoint/2010/main" val="3465112707"/>
+      </p:ext>
+    </p:extLst>
+  </p:cSld>
+  <p:clrMapOvr>
+    <a:masterClrMapping/>
+  </p:clrMapOvr>
+</p:sld>
+</file>
+
+<file path=ppt/slides/slide24.xml><?xml version="1.0" encoding="utf-8"?>
+<p:sld xmlns:a="http://schemas.openxmlformats.org/drawingml/2006/main" xmlns:r="http://schemas.openxmlformats.org/officeDocument/2006/relationships" xmlns:p="http://schemas.openxmlformats.org/presentationml/2006/main">
+  <p:cSld>
+    <p:spTree>
+      <p:nvGrpSpPr>
+        <p:cNvPr id="1" name=""/>
+        <p:cNvGrpSpPr/>
+        <p:nvPr/>
+      </p:nvGrpSpPr>
+      <p:grpSpPr>
+        <a:xfrm>
+          <a:off x="0" y="0"/>
+          <a:ext cx="0" cy="0"/>
+          <a:chOff x="0" y="0"/>
+          <a:chExt cx="0" cy="0"/>
+        </a:xfrm>
+      </p:grpSpPr>
+      <p:sp>
+        <p:nvSpPr>
+          <p:cNvPr id="2" name="Content Placeholder 1"/>
+          <p:cNvSpPr>
+            <a:spLocks noGrp="1"/>
+          </p:cNvSpPr>
+          <p:nvPr>
+            <p:ph idx="1"/>
+          </p:nvPr>
+        </p:nvSpPr>
+        <p:spPr/>
+        <p:txBody>
+          <a:bodyPr/>
+          <a:lstStyle/>
+          <a:p>
+            <a:endParaRPr lang="en-GB"/>
+          </a:p>
+        </p:txBody>
+      </p:sp>
+      <p:sp>
+        <p:nvSpPr>
+          <p:cNvPr id="3" name="Title 2"/>
+          <p:cNvSpPr>
+            <a:spLocks noGrp="1"/>
+          </p:cNvSpPr>
+          <p:nvPr>
+            <p:ph type="title"/>
+          </p:nvPr>
+        </p:nvSpPr>
+        <p:spPr/>
+        <p:txBody>
+          <a:bodyPr/>
+          <a:lstStyle/>
+          <a:p>
+            <a:r>
+              <a:rPr lang="en-GB" dirty="0" err="1"/>
+              <a:t>Vragen</a:t>
+            </a:r>
+            <a:r>
+              <a:rPr lang="en-GB" dirty="0"/>
+              <a:t>?</a:t>
+            </a:r>
+          </a:p>
+        </p:txBody>
+      </p:sp>
+      <p:sp>
+        <p:nvSpPr>
+          <p:cNvPr id="4" name="Slide Number Placeholder 3"/>
+          <p:cNvSpPr>
+            <a:spLocks noGrp="1"/>
+          </p:cNvSpPr>
+          <p:nvPr>
+            <p:ph type="sldNum" sz="quarter" idx="11"/>
+          </p:nvPr>
+        </p:nvSpPr>
+        <p:spPr/>
+        <p:txBody>
+          <a:bodyPr/>
+          <a:lstStyle/>
+          <a:p>
+            <a:fld id="{3B80295F-48CD-49FC-897A-CCEC919B8070}" type="slidenum">
+              <a:rPr lang="nl-BE" smtClean="0"/>
+              <a:pPr/>
+              <a:t>24</a:t>
             </a:fld>
             <a:endParaRPr lang="nl-BE" dirty="0"/>
           </a:p>
@@ -8551,7 +9038,7 @@
 </file>
 
 <file path=customXml/itemProps1.xml><?xml version="1.0" encoding="utf-8"?>
-<ds:datastoreItem xmlns:ds="http://schemas.openxmlformats.org/officeDocument/2006/customXml" ds:itemID="{3B208277-3A85-41C0-850B-CE8E4B3AD84C}">
+<ds:datastoreItem xmlns:ds="http://schemas.openxmlformats.org/officeDocument/2006/customXml" ds:itemID="{11AF8639-F54A-49A8-AB7E-6AB5838D1B01}">
   <ds:schemaRefs>
     <ds:schemaRef ds:uri="http://schemas.microsoft.com/VisualStudio/2011/storyboarding/control"/>
   </ds:schemaRefs>
@@ -8567,7 +9054,7 @@
 </file>
 
 <file path=customXml/itemProps3.xml><?xml version="1.0" encoding="utf-8"?>
-<ds:datastoreItem xmlns:ds="http://schemas.openxmlformats.org/officeDocument/2006/customXml" ds:itemID="{11AF8639-F54A-49A8-AB7E-6AB5838D1B01}">
+<ds:datastoreItem xmlns:ds="http://schemas.openxmlformats.org/officeDocument/2006/customXml" ds:itemID="{3B208277-3A85-41C0-850B-CE8E4B3AD84C}">
   <ds:schemaRefs>
     <ds:schemaRef ds:uri="http://schemas.microsoft.com/VisualStudio/2011/storyboarding/control"/>
   </ds:schemaRefs>
@@ -8575,7 +9062,7 @@
 </file>
 
 <file path=customXml/itemProps4.xml><?xml version="1.0" encoding="utf-8"?>
-<ds:datastoreItem xmlns:ds="http://schemas.openxmlformats.org/officeDocument/2006/customXml" ds:itemID="{470D613B-EEA2-445F-86A4-E370AE21703E}">
+<ds:datastoreItem xmlns:ds="http://schemas.openxmlformats.org/officeDocument/2006/customXml" ds:itemID="{6E1AAB08-5670-41ED-AB5D-6E0D0F51521A}">
   <ds:schemaRefs>
     <ds:schemaRef ds:uri="http://schemas.microsoft.com/VisualStudio/2011/storyboarding/control"/>
   </ds:schemaRefs>
@@ -8583,7 +9070,7 @@
 </file>
 
 <file path=customXml/itemProps5.xml><?xml version="1.0" encoding="utf-8"?>
-<ds:datastoreItem xmlns:ds="http://schemas.openxmlformats.org/officeDocument/2006/customXml" ds:itemID="{6E1AAB08-5670-41ED-AB5D-6E0D0F51521A}">
+<ds:datastoreItem xmlns:ds="http://schemas.openxmlformats.org/officeDocument/2006/customXml" ds:itemID="{470D613B-EEA2-445F-86A4-E370AE21703E}">
   <ds:schemaRefs>
     <ds:schemaRef ds:uri="http://schemas.microsoft.com/VisualStudio/2011/storyboarding/control"/>
   </ds:schemaRefs>

</xml_diff>